<commit_message>
Added another reverse dictionary.
</commit_message>
<xml_diff>
--- a/final/doc/presentation.pptx
+++ b/final/doc/presentation.pptx
@@ -3576,11 +3576,7 @@
           <a:p>
             <a:r>
               <a:rPr lang="en-US" sz="3600" dirty="0" smtClean="0"/>
-              <a:t>Semantic </a:t>
-            </a:r>
-            <a:r>
-              <a:rPr lang="en-US" sz="3600" dirty="0" smtClean="0"/>
-              <a:t>Relatedness Applications</a:t>
+              <a:t>Semantic Relatedness Applications</a:t>
             </a:r>
             <a:endParaRPr lang="en-US" sz="3600" dirty="0"/>
           </a:p>
@@ -4135,11 +4131,7 @@
                     <a:p>
                       <a:r>
                         <a:rPr lang="en-US" dirty="0" smtClean="0"/>
-                        <a:t>0.19</a:t>
-                      </a:r>
-                      <a:r>
-                        <a:rPr lang="en-US" dirty="0" smtClean="0"/>
-                        <a:t>–0.48</a:t>
+                        <a:t>0.19–0.48</a:t>
                       </a:r>
                       <a:endParaRPr lang="en-US" dirty="0"/>
                     </a:p>
@@ -4353,7 +4345,6 @@
               <a:rPr lang="en-US" sz="2400" dirty="0" smtClean="0"/>
               <a:t>An improved measure of semantic relatedness between two words or phrases</a:t>
             </a:r>
-            <a:endParaRPr lang="en-US" sz="2400" dirty="0" smtClean="0"/>
           </a:p>
           <a:p>
             <a:endParaRPr lang="en-US" sz="2400" dirty="0"/>
@@ -4881,8 +4872,8 @@
           </a:p>
         </p:txBody>
       </p:sp>
-      <mc:AlternateContent xmlns:mc="http://schemas.openxmlformats.org/markup-compatibility/2006">
-        <mc:Choice xmlns:a14="http://schemas.microsoft.com/office/drawing/2010/main" Requires="a14">
+      <mc:AlternateContent xmlns:mc="http://schemas.openxmlformats.org/markup-compatibility/2006" xmlns:a14="http://schemas.microsoft.com/office/drawing/2010/main">
+        <mc:Choice Requires="a14">
           <p:sp>
             <p:nvSpPr>
               <p:cNvPr id="3" name="Content Placeholder 2"/>
@@ -5485,7 +5476,7 @@
             </p:txBody>
           </p:sp>
         </mc:Choice>
-        <mc:Fallback>
+        <mc:Fallback xmlns="">
           <p:sp>
             <p:nvSpPr>
               <p:cNvPr id="3" name="Content Placeholder 2"/>
@@ -5785,7 +5776,33 @@
             </a:r>
             <a:r>
               <a:rPr lang="en-US" sz="2000" dirty="0" smtClean="0"/>
-              <a:t>reference.com/reverse&gt;</a:t>
+              <a:t>reference.com/reverse</a:t>
+            </a:r>
+            <a:r>
+              <a:rPr lang="en-US" sz="2000" dirty="0" smtClean="0"/>
+              <a:t>&gt;</a:t>
+            </a:r>
+          </a:p>
+          <a:p>
+            <a:pPr lvl="1">
+              <a:buFont typeface="Courier New" panose="02070309020205020404" pitchFamily="49" charset="0"/>
+              <a:buChar char="o"/>
+            </a:pPr>
+            <a:r>
+              <a:rPr lang="en-US" sz="2000" dirty="0"/>
+              <a:t>Reverse Dictionary &lt;</a:t>
+            </a:r>
+            <a:r>
+              <a:rPr lang="en-US" sz="2000" dirty="0" smtClean="0"/>
+              <a:t>worddictionary.com.au/reverse-</a:t>
+            </a:r>
+            <a:r>
+              <a:rPr lang="en-US" sz="2000" dirty="0" err="1" smtClean="0"/>
+              <a:t>dictionary.php</a:t>
+            </a:r>
+            <a:r>
+              <a:rPr lang="en-US" sz="2000" smtClean="0"/>
+              <a:t>&gt;</a:t>
             </a:r>
             <a:endParaRPr lang="en-US" sz="2000" dirty="0"/>
           </a:p>

</xml_diff>